<commit_message>
Added charts to presentation
</commit_message>
<xml_diff>
--- a/Project Presentation - Amazon Reviews.pptx
+++ b/Project Presentation - Amazon Reviews.pptx
@@ -13,10 +13,11 @@
     <p:sldId id="264" r:id="rId7"/>
     <p:sldId id="265" r:id="rId8"/>
     <p:sldId id="262" r:id="rId9"/>
-    <p:sldId id="267" r:id="rId10"/>
-    <p:sldId id="258" r:id="rId11"/>
-    <p:sldId id="268" r:id="rId12"/>
-    <p:sldId id="269" r:id="rId13"/>
+    <p:sldId id="270" r:id="rId10"/>
+    <p:sldId id="267" r:id="rId11"/>
+    <p:sldId id="258" r:id="rId12"/>
+    <p:sldId id="268" r:id="rId13"/>
+    <p:sldId id="269" r:id="rId14"/>
   </p:sldIdLst>
   <p:sldSz cx="12192000" cy="6858000"/>
   <p:notesSz cx="6858000" cy="9144000"/>
@@ -115,6 +116,11 @@
       </a:defRPr>
     </a:lvl9pPr>
   </p:defaultTextStyle>
+  <p:extLst>
+    <p:ext uri="{EFAFB233-063F-42B5-8137-9DF3F51BA10A}">
+      <p15:sldGuideLst xmlns:p15="http://schemas.microsoft.com/office/powerpoint/2012/main"/>
+    </p:ext>
+  </p:extLst>
 </p:presentation>
 </file>
 
@@ -459,7 +465,7 @@
           </a:lstStyle>
           <a:p>
             <a:r>
-              <a:rPr lang="en-US" smtClean="0"/>
+              <a:rPr lang="en-US"/>
               <a:t>Click to edit Master title style</a:t>
             </a:r>
             <a:endParaRPr lang="en-US" dirty="0"/>
@@ -532,7 +538,7 @@
           </a:lstStyle>
           <a:p>
             <a:r>
-              <a:rPr lang="en-US" smtClean="0"/>
+              <a:rPr lang="en-US"/>
               <a:t>Click to edit Master subtitle style</a:t>
             </a:r>
             <a:endParaRPr lang="en-US" dirty="0"/>
@@ -571,7 +577,7 @@
           <a:p>
             <a:fld id="{F7AFFB9B-9FB8-469E-96F9-4D32314110B6}" type="datetimeFigureOut">
               <a:rPr lang="en-US" dirty="0"/>
-              <a:t>7/16/2019</a:t>
+              <a:t>7/17/2019</a:t>
             </a:fld>
             <a:endParaRPr lang="en-US" dirty="0"/>
           </a:p>
@@ -737,7 +743,7 @@
           </a:lstStyle>
           <a:p>
             <a:r>
-              <a:rPr lang="en-US" smtClean="0"/>
+              <a:rPr lang="en-US"/>
               <a:t>Click to edit Master title style</a:t>
             </a:r>
             <a:endParaRPr lang="en-US" dirty="0"/>
@@ -810,7 +816,7 @@
           </a:lstStyle>
           <a:p>
             <a:r>
-              <a:rPr lang="en-US" smtClean="0"/>
+              <a:rPr lang="en-US"/>
               <a:t>Click icon to add picture</a:t>
             </a:r>
             <a:endParaRPr lang="en-US" dirty="0"/>
@@ -876,7 +882,7 @@
           <a:p>
             <a:pPr lvl="0"/>
             <a:r>
-              <a:rPr lang="en-US" smtClean="0"/>
+              <a:rPr lang="en-US"/>
               <a:t>Click to edit Master text styles</a:t>
             </a:r>
           </a:p>
@@ -899,7 +905,7 @@
           <a:p>
             <a:fld id="{341D2AC3-6A0B-4169-B1EA-E3AE8B351BDD}" type="datetimeFigureOut">
               <a:rPr lang="en-US" dirty="0"/>
-              <a:t>7/16/2019</a:t>
+              <a:t>7/17/2019</a:t>
             </a:fld>
             <a:endParaRPr lang="en-US" dirty="0"/>
           </a:p>
@@ -999,7 +1005,7 @@
           </a:lstStyle>
           <a:p>
             <a:r>
-              <a:rPr lang="en-US" smtClean="0"/>
+              <a:rPr lang="en-US"/>
               <a:t>Click to edit Master title style</a:t>
             </a:r>
             <a:endParaRPr lang="en-US" dirty="0"/>
@@ -1067,7 +1073,7 @@
           <a:p>
             <a:pPr lvl="0"/>
             <a:r>
-              <a:rPr lang="en-US" smtClean="0"/>
+              <a:rPr lang="en-US"/>
               <a:t>Click to edit Master text styles</a:t>
             </a:r>
           </a:p>
@@ -1090,7 +1096,7 @@
           <a:p>
             <a:fld id="{DD4B9363-8B87-41B7-9F8E-64519CBB8F34}" type="datetimeFigureOut">
               <a:rPr lang="en-US" dirty="0"/>
-              <a:t>7/16/2019</a:t>
+              <a:t>7/17/2019</a:t>
             </a:fld>
             <a:endParaRPr lang="en-US" dirty="0"/>
           </a:p>
@@ -1190,7 +1196,7 @@
           </a:lstStyle>
           <a:p>
             <a:r>
-              <a:rPr lang="en-US" smtClean="0"/>
+              <a:rPr lang="en-US"/>
               <a:t>Click to edit Master title style</a:t>
             </a:r>
             <a:endParaRPr lang="en-US" dirty="0"/>
@@ -1265,7 +1271,7 @@
           <a:p>
             <a:pPr lvl="0"/>
             <a:r>
-              <a:rPr lang="en-US" smtClean="0"/>
+              <a:rPr lang="en-US"/>
               <a:t>Click to edit Master text styles</a:t>
             </a:r>
           </a:p>
@@ -1332,7 +1338,7 @@
           <a:p>
             <a:pPr lvl="0"/>
             <a:r>
-              <a:rPr lang="en-US" smtClean="0"/>
+              <a:rPr lang="en-US"/>
               <a:t>Click to edit Master text styles</a:t>
             </a:r>
           </a:p>
@@ -1355,7 +1361,7 @@
           <a:p>
             <a:fld id="{EAEF5746-5284-4951-9F37-7AE924EDBCB7}" type="datetimeFigureOut">
               <a:rPr lang="en-US" dirty="0"/>
-              <a:t>7/16/2019</a:t>
+              <a:t>7/17/2019</a:t>
             </a:fld>
             <a:endParaRPr lang="en-US" dirty="0"/>
           </a:p>
@@ -1687,7 +1693,7 @@
           </a:lstStyle>
           <a:p>
             <a:r>
-              <a:rPr lang="en-US" smtClean="0"/>
+              <a:rPr lang="en-US"/>
               <a:t>Click to edit Master title style</a:t>
             </a:r>
             <a:endParaRPr lang="en-US" dirty="0"/>
@@ -1755,7 +1761,7 @@
           <a:p>
             <a:pPr lvl="0"/>
             <a:r>
-              <a:rPr lang="en-US" smtClean="0"/>
+              <a:rPr lang="en-US"/>
               <a:t>Click to edit Master text styles</a:t>
             </a:r>
           </a:p>
@@ -1778,7 +1784,7 @@
           <a:p>
             <a:fld id="{02398B29-7265-4A65-A2A4-6703C057B7C1}" type="datetimeFigureOut">
               <a:rPr lang="en-US" dirty="0"/>
-              <a:t>7/16/2019</a:t>
+              <a:t>7/17/2019</a:t>
             </a:fld>
             <a:endParaRPr lang="en-US" dirty="0"/>
           </a:p>
@@ -1876,7 +1882,7 @@
           </a:lstStyle>
           <a:p>
             <a:r>
-              <a:rPr lang="en-US" smtClean="0"/>
+              <a:rPr lang="en-US"/>
               <a:t>Click to edit Master title style</a:t>
             </a:r>
             <a:endParaRPr lang="en-US" dirty="0"/>
@@ -1951,7 +1957,7 @@
           <a:p>
             <a:pPr lvl="0"/>
             <a:r>
-              <a:rPr lang="en-US" smtClean="0"/>
+              <a:rPr lang="en-US"/>
               <a:t>Click to edit Master text styles</a:t>
             </a:r>
           </a:p>
@@ -2018,7 +2024,7 @@
           <a:p>
             <a:pPr lvl="0"/>
             <a:r>
-              <a:rPr lang="en-US" smtClean="0"/>
+              <a:rPr lang="en-US"/>
               <a:t>Click to edit Master text styles</a:t>
             </a:r>
           </a:p>
@@ -2092,7 +2098,7 @@
           <a:p>
             <a:pPr lvl="0"/>
             <a:r>
-              <a:rPr lang="en-US" smtClean="0"/>
+              <a:rPr lang="en-US"/>
               <a:t>Click to edit Master text styles</a:t>
             </a:r>
           </a:p>
@@ -2159,7 +2165,7 @@
           <a:p>
             <a:pPr lvl="0"/>
             <a:r>
-              <a:rPr lang="en-US" smtClean="0"/>
+              <a:rPr lang="en-US"/>
               <a:t>Click to edit Master text styles</a:t>
             </a:r>
           </a:p>
@@ -2233,7 +2239,7 @@
           <a:p>
             <a:pPr lvl="0"/>
             <a:r>
-              <a:rPr lang="en-US" smtClean="0"/>
+              <a:rPr lang="en-US"/>
               <a:t>Click to edit Master text styles</a:t>
             </a:r>
           </a:p>
@@ -2300,7 +2306,7 @@
           <a:p>
             <a:pPr lvl="0"/>
             <a:r>
-              <a:rPr lang="en-US" smtClean="0"/>
+              <a:rPr lang="en-US"/>
               <a:t>Click to edit Master text styles</a:t>
             </a:r>
           </a:p>
@@ -2323,7 +2329,7 @@
           <a:p>
             <a:fld id="{28FBA082-94DF-4C4B-A041-6624924AB0A8}" type="datetimeFigureOut">
               <a:rPr lang="en-US" dirty="0"/>
-              <a:t>7/16/2019</a:t>
+              <a:t>7/17/2019</a:t>
             </a:fld>
             <a:endParaRPr lang="en-US" dirty="0"/>
           </a:p>
@@ -2421,7 +2427,7 @@
           </a:lstStyle>
           <a:p>
             <a:r>
-              <a:rPr lang="en-US" smtClean="0"/>
+              <a:rPr lang="en-US"/>
               <a:t>Click to edit Master title style</a:t>
             </a:r>
             <a:endParaRPr lang="en-US" dirty="0"/>
@@ -2496,7 +2502,7 @@
           <a:p>
             <a:pPr lvl="0"/>
             <a:r>
-              <a:rPr lang="en-US" smtClean="0"/>
+              <a:rPr lang="en-US"/>
               <a:t>Click to edit Master text styles</a:t>
             </a:r>
           </a:p>
@@ -2575,7 +2581,7 @@
           </a:lstStyle>
           <a:p>
             <a:r>
-              <a:rPr lang="en-US" smtClean="0"/>
+              <a:rPr lang="en-US"/>
               <a:t>Click icon to add picture</a:t>
             </a:r>
             <a:endParaRPr lang="en-US" dirty="0"/>
@@ -2643,7 +2649,7 @@
           <a:p>
             <a:pPr lvl="0"/>
             <a:r>
-              <a:rPr lang="en-US" smtClean="0"/>
+              <a:rPr lang="en-US"/>
               <a:t>Click to edit Master text styles</a:t>
             </a:r>
           </a:p>
@@ -2717,7 +2723,7 @@
           <a:p>
             <a:pPr lvl="0"/>
             <a:r>
-              <a:rPr lang="en-US" smtClean="0"/>
+              <a:rPr lang="en-US"/>
               <a:t>Click to edit Master text styles</a:t>
             </a:r>
           </a:p>
@@ -2796,7 +2802,7 @@
           </a:lstStyle>
           <a:p>
             <a:r>
-              <a:rPr lang="en-US" smtClean="0"/>
+              <a:rPr lang="en-US"/>
               <a:t>Click icon to add picture</a:t>
             </a:r>
             <a:endParaRPr lang="en-US" dirty="0"/>
@@ -2864,7 +2870,7 @@
           <a:p>
             <a:pPr lvl="0"/>
             <a:r>
-              <a:rPr lang="en-US" smtClean="0"/>
+              <a:rPr lang="en-US"/>
               <a:t>Click to edit Master text styles</a:t>
             </a:r>
           </a:p>
@@ -2938,7 +2944,7 @@
           <a:p>
             <a:pPr lvl="0"/>
             <a:r>
-              <a:rPr lang="en-US" smtClean="0"/>
+              <a:rPr lang="en-US"/>
               <a:t>Click to edit Master text styles</a:t>
             </a:r>
           </a:p>
@@ -3017,7 +3023,7 @@
           </a:lstStyle>
           <a:p>
             <a:r>
-              <a:rPr lang="en-US" smtClean="0"/>
+              <a:rPr lang="en-US"/>
               <a:t>Click icon to add picture</a:t>
             </a:r>
             <a:endParaRPr lang="en-US" dirty="0"/>
@@ -3085,7 +3091,7 @@
           <a:p>
             <a:pPr lvl="0"/>
             <a:r>
-              <a:rPr lang="en-US" smtClean="0"/>
+              <a:rPr lang="en-US"/>
               <a:t>Click to edit Master text styles</a:t>
             </a:r>
           </a:p>
@@ -3108,7 +3114,7 @@
           <a:p>
             <a:fld id="{B27686C4-3AB5-4E0C-86CA-FB108C350AA9}" type="datetimeFigureOut">
               <a:rPr lang="en-US" dirty="0"/>
-              <a:t>7/16/2019</a:t>
+              <a:t>7/17/2019</a:t>
             </a:fld>
             <a:endParaRPr lang="en-US" dirty="0"/>
           </a:p>
@@ -3201,7 +3207,7 @@
           </a:lstStyle>
           <a:p>
             <a:r>
-              <a:rPr lang="en-US" smtClean="0"/>
+              <a:rPr lang="en-US"/>
               <a:t>Click to edit Master title style</a:t>
             </a:r>
             <a:endParaRPr lang="en-US" dirty="0"/>
@@ -3230,35 +3236,35 @@
           <a:p>
             <a:pPr lvl="0"/>
             <a:r>
-              <a:rPr lang="en-US" smtClean="0"/>
+              <a:rPr lang="en-US"/>
               <a:t>Click to edit Master text styles</a:t>
             </a:r>
           </a:p>
           <a:p>
             <a:pPr lvl="1"/>
             <a:r>
-              <a:rPr lang="en-US" smtClean="0"/>
+              <a:rPr lang="en-US"/>
               <a:t>Second level</a:t>
             </a:r>
           </a:p>
           <a:p>
             <a:pPr lvl="2"/>
             <a:r>
-              <a:rPr lang="en-US" smtClean="0"/>
+              <a:rPr lang="en-US"/>
               <a:t>Third level</a:t>
             </a:r>
           </a:p>
           <a:p>
             <a:pPr lvl="3"/>
             <a:r>
-              <a:rPr lang="en-US" smtClean="0"/>
+              <a:rPr lang="en-US"/>
               <a:t>Fourth level</a:t>
             </a:r>
           </a:p>
           <a:p>
             <a:pPr lvl="4"/>
             <a:r>
-              <a:rPr lang="en-US" smtClean="0"/>
+              <a:rPr lang="en-US"/>
               <a:t>Fifth level</a:t>
             </a:r>
             <a:endParaRPr lang="en-US" dirty="0"/>
@@ -3282,7 +3288,7 @@
           <a:p>
             <a:fld id="{49FF1211-4E0C-4AB3-B04F-585959BDAFE8}" type="datetimeFigureOut">
               <a:rPr lang="en-US" dirty="0"/>
-              <a:t>7/16/2019</a:t>
+              <a:t>7/17/2019</a:t>
             </a:fld>
             <a:endParaRPr lang="en-US" dirty="0"/>
           </a:p>
@@ -3380,7 +3386,7 @@
           </a:lstStyle>
           <a:p>
             <a:r>
-              <a:rPr lang="en-US" smtClean="0"/>
+              <a:rPr lang="en-US"/>
               <a:t>Click to edit Master title style</a:t>
             </a:r>
             <a:endParaRPr lang="en-US" dirty="0"/>
@@ -3409,35 +3415,35 @@
           <a:p>
             <a:pPr lvl="0"/>
             <a:r>
-              <a:rPr lang="en-US" smtClean="0"/>
+              <a:rPr lang="en-US"/>
               <a:t>Click to edit Master text styles</a:t>
             </a:r>
           </a:p>
           <a:p>
             <a:pPr lvl="1"/>
             <a:r>
-              <a:rPr lang="en-US" smtClean="0"/>
+              <a:rPr lang="en-US"/>
               <a:t>Second level</a:t>
             </a:r>
           </a:p>
           <a:p>
             <a:pPr lvl="2"/>
             <a:r>
-              <a:rPr lang="en-US" smtClean="0"/>
+              <a:rPr lang="en-US"/>
               <a:t>Third level</a:t>
             </a:r>
           </a:p>
           <a:p>
             <a:pPr lvl="3"/>
             <a:r>
-              <a:rPr lang="en-US" smtClean="0"/>
+              <a:rPr lang="en-US"/>
               <a:t>Fourth level</a:t>
             </a:r>
           </a:p>
           <a:p>
             <a:pPr lvl="4"/>
             <a:r>
-              <a:rPr lang="en-US" smtClean="0"/>
+              <a:rPr lang="en-US"/>
               <a:t>Fifth level</a:t>
             </a:r>
             <a:endParaRPr lang="en-US" dirty="0"/>
@@ -3461,7 +3467,7 @@
           <a:p>
             <a:fld id="{28BDECAF-D3BE-4069-9C78-642ECCD01477}" type="datetimeFigureOut">
               <a:rPr lang="en-US" dirty="0"/>
-              <a:t>7/16/2019</a:t>
+              <a:t>7/17/2019</a:t>
             </a:fld>
             <a:endParaRPr lang="en-US" dirty="0"/>
           </a:p>
@@ -3550,7 +3556,7 @@
           <a:lstStyle/>
           <a:p>
             <a:r>
-              <a:rPr lang="en-US" smtClean="0"/>
+              <a:rPr lang="en-US"/>
               <a:t>Click to edit Master title style</a:t>
             </a:r>
             <a:endParaRPr lang="en-US" dirty="0"/>
@@ -3579,35 +3585,35 @@
           <a:p>
             <a:pPr lvl="0"/>
             <a:r>
-              <a:rPr lang="en-US" smtClean="0"/>
+              <a:rPr lang="en-US"/>
               <a:t>Click to edit Master text styles</a:t>
             </a:r>
           </a:p>
           <a:p>
             <a:pPr lvl="1"/>
             <a:r>
-              <a:rPr lang="en-US" smtClean="0"/>
+              <a:rPr lang="en-US"/>
               <a:t>Second level</a:t>
             </a:r>
           </a:p>
           <a:p>
             <a:pPr lvl="2"/>
             <a:r>
-              <a:rPr lang="en-US" smtClean="0"/>
+              <a:rPr lang="en-US"/>
               <a:t>Third level</a:t>
             </a:r>
           </a:p>
           <a:p>
             <a:pPr lvl="3"/>
             <a:r>
-              <a:rPr lang="en-US" smtClean="0"/>
+              <a:rPr lang="en-US"/>
               <a:t>Fourth level</a:t>
             </a:r>
           </a:p>
           <a:p>
             <a:pPr lvl="4"/>
             <a:r>
-              <a:rPr lang="en-US" smtClean="0"/>
+              <a:rPr lang="en-US"/>
               <a:t>Fifth level</a:t>
             </a:r>
             <a:endParaRPr lang="en-US" dirty="0"/>
@@ -3631,7 +3637,7 @@
           <a:p>
             <a:fld id="{8EFBDC27-E420-4878-9EE6-7B9656D6442A}" type="datetimeFigureOut">
               <a:rPr lang="en-US" dirty="0"/>
-              <a:t>7/16/2019</a:t>
+              <a:t>7/17/2019</a:t>
             </a:fld>
             <a:endParaRPr lang="en-US" dirty="0"/>
           </a:p>
@@ -3731,7 +3737,7 @@
           </a:lstStyle>
           <a:p>
             <a:r>
-              <a:rPr lang="en-US" smtClean="0"/>
+              <a:rPr lang="en-US"/>
               <a:t>Click to edit Master title style</a:t>
             </a:r>
             <a:endParaRPr lang="en-US" dirty="0"/>
@@ -3853,7 +3859,7 @@
           <a:p>
             <a:pPr lvl="0"/>
             <a:r>
-              <a:rPr lang="en-US" smtClean="0"/>
+              <a:rPr lang="en-US"/>
               <a:t>Click to edit Master text styles</a:t>
             </a:r>
           </a:p>
@@ -3876,7 +3882,7 @@
           <a:p>
             <a:fld id="{0F7F47CF-67C9-420C-80A5-E2069FF0C2DF}" type="datetimeFigureOut">
               <a:rPr lang="en-US" dirty="0"/>
-              <a:t>7/16/2019</a:t>
+              <a:t>7/17/2019</a:t>
             </a:fld>
             <a:endParaRPr lang="en-US" dirty="0"/>
           </a:p>
@@ -3970,7 +3976,7 @@
           <a:lstStyle/>
           <a:p>
             <a:r>
-              <a:rPr lang="en-US" smtClean="0"/>
+              <a:rPr lang="en-US"/>
               <a:t>Click to edit Master title style</a:t>
             </a:r>
             <a:endParaRPr lang="en-US" dirty="0"/>
@@ -3999,35 +4005,35 @@
           <a:p>
             <a:pPr lvl="0"/>
             <a:r>
-              <a:rPr lang="en-US" smtClean="0"/>
+              <a:rPr lang="en-US"/>
               <a:t>Click to edit Master text styles</a:t>
             </a:r>
           </a:p>
           <a:p>
             <a:pPr lvl="1"/>
             <a:r>
-              <a:rPr lang="en-US" smtClean="0"/>
+              <a:rPr lang="en-US"/>
               <a:t>Second level</a:t>
             </a:r>
           </a:p>
           <a:p>
             <a:pPr lvl="2"/>
             <a:r>
-              <a:rPr lang="en-US" smtClean="0"/>
+              <a:rPr lang="en-US"/>
               <a:t>Third level</a:t>
             </a:r>
           </a:p>
           <a:p>
             <a:pPr lvl="3"/>
             <a:r>
-              <a:rPr lang="en-US" smtClean="0"/>
+              <a:rPr lang="en-US"/>
               <a:t>Fourth level</a:t>
             </a:r>
           </a:p>
           <a:p>
             <a:pPr lvl="4"/>
             <a:r>
-              <a:rPr lang="en-US" smtClean="0"/>
+              <a:rPr lang="en-US"/>
               <a:t>Fifth level</a:t>
             </a:r>
             <a:endParaRPr lang="en-US" dirty="0"/>
@@ -4056,35 +4062,35 @@
           <a:p>
             <a:pPr lvl="0"/>
             <a:r>
-              <a:rPr lang="en-US" smtClean="0"/>
+              <a:rPr lang="en-US"/>
               <a:t>Click to edit Master text styles</a:t>
             </a:r>
           </a:p>
           <a:p>
             <a:pPr lvl="1"/>
             <a:r>
-              <a:rPr lang="en-US" smtClean="0"/>
+              <a:rPr lang="en-US"/>
               <a:t>Second level</a:t>
             </a:r>
           </a:p>
           <a:p>
             <a:pPr lvl="2"/>
             <a:r>
-              <a:rPr lang="en-US" smtClean="0"/>
+              <a:rPr lang="en-US"/>
               <a:t>Third level</a:t>
             </a:r>
           </a:p>
           <a:p>
             <a:pPr lvl="3"/>
             <a:r>
-              <a:rPr lang="en-US" smtClean="0"/>
+              <a:rPr lang="en-US"/>
               <a:t>Fourth level</a:t>
             </a:r>
           </a:p>
           <a:p>
             <a:pPr lvl="4"/>
             <a:r>
-              <a:rPr lang="en-US" smtClean="0"/>
+              <a:rPr lang="en-US"/>
               <a:t>Fifth level</a:t>
             </a:r>
             <a:endParaRPr lang="en-US" dirty="0"/>
@@ -4108,7 +4114,7 @@
           <a:p>
             <a:fld id="{AE22DC73-F065-42F5-A9F2-D90B2E42A0B3}" type="datetimeFigureOut">
               <a:rPr lang="en-US" dirty="0"/>
-              <a:t>7/16/2019</a:t>
+              <a:t>7/17/2019</a:t>
             </a:fld>
             <a:endParaRPr lang="en-US" dirty="0"/>
           </a:p>
@@ -4202,7 +4208,7 @@
           <a:lstStyle/>
           <a:p>
             <a:r>
-              <a:rPr lang="en-US" smtClean="0"/>
+              <a:rPr lang="en-US"/>
               <a:t>Click to edit Master title style</a:t>
             </a:r>
             <a:endParaRPr lang="en-US" dirty="0"/>
@@ -4277,7 +4283,7 @@
           <a:p>
             <a:pPr lvl="0"/>
             <a:r>
-              <a:rPr lang="en-US" smtClean="0"/>
+              <a:rPr lang="en-US"/>
               <a:t>Click to edit Master text styles</a:t>
             </a:r>
           </a:p>
@@ -4305,35 +4311,35 @@
           <a:p>
             <a:pPr lvl="0"/>
             <a:r>
-              <a:rPr lang="en-US" smtClean="0"/>
+              <a:rPr lang="en-US"/>
               <a:t>Click to edit Master text styles</a:t>
             </a:r>
           </a:p>
           <a:p>
             <a:pPr lvl="1"/>
             <a:r>
-              <a:rPr lang="en-US" smtClean="0"/>
+              <a:rPr lang="en-US"/>
               <a:t>Second level</a:t>
             </a:r>
           </a:p>
           <a:p>
             <a:pPr lvl="2"/>
             <a:r>
-              <a:rPr lang="en-US" smtClean="0"/>
+              <a:rPr lang="en-US"/>
               <a:t>Third level</a:t>
             </a:r>
           </a:p>
           <a:p>
             <a:pPr lvl="3"/>
             <a:r>
-              <a:rPr lang="en-US" smtClean="0"/>
+              <a:rPr lang="en-US"/>
               <a:t>Fourth level</a:t>
             </a:r>
           </a:p>
           <a:p>
             <a:pPr lvl="4"/>
             <a:r>
-              <a:rPr lang="en-US" smtClean="0"/>
+              <a:rPr lang="en-US"/>
               <a:t>Fifth level</a:t>
             </a:r>
             <a:endParaRPr lang="en-US" dirty="0"/>
@@ -4408,7 +4414,7 @@
           <a:p>
             <a:pPr lvl="0"/>
             <a:r>
-              <a:rPr lang="en-US" smtClean="0"/>
+              <a:rPr lang="en-US"/>
               <a:t>Click to edit Master text styles</a:t>
             </a:r>
           </a:p>
@@ -4436,35 +4442,35 @@
           <a:p>
             <a:pPr lvl="0"/>
             <a:r>
-              <a:rPr lang="en-US" smtClean="0"/>
+              <a:rPr lang="en-US"/>
               <a:t>Click to edit Master text styles</a:t>
             </a:r>
           </a:p>
           <a:p>
             <a:pPr lvl="1"/>
             <a:r>
-              <a:rPr lang="en-US" smtClean="0"/>
+              <a:rPr lang="en-US"/>
               <a:t>Second level</a:t>
             </a:r>
           </a:p>
           <a:p>
             <a:pPr lvl="2"/>
             <a:r>
-              <a:rPr lang="en-US" smtClean="0"/>
+              <a:rPr lang="en-US"/>
               <a:t>Third level</a:t>
             </a:r>
           </a:p>
           <a:p>
             <a:pPr lvl="3"/>
             <a:r>
-              <a:rPr lang="en-US" smtClean="0"/>
+              <a:rPr lang="en-US"/>
               <a:t>Fourth level</a:t>
             </a:r>
           </a:p>
           <a:p>
             <a:pPr lvl="4"/>
             <a:r>
-              <a:rPr lang="en-US" smtClean="0"/>
+              <a:rPr lang="en-US"/>
               <a:t>Fifth level</a:t>
             </a:r>
             <a:endParaRPr lang="en-US" dirty="0"/>
@@ -4488,7 +4494,7 @@
           <a:p>
             <a:fld id="{76BEA702-9B29-41CC-9BCC-3DF8A0D379FE}" type="datetimeFigureOut">
               <a:rPr lang="en-US" dirty="0"/>
-              <a:t>7/16/2019</a:t>
+              <a:t>7/17/2019</a:t>
             </a:fld>
             <a:endParaRPr lang="en-US" dirty="0"/>
           </a:p>
@@ -4577,7 +4583,7 @@
           <a:lstStyle/>
           <a:p>
             <a:r>
-              <a:rPr lang="en-US" smtClean="0"/>
+              <a:rPr lang="en-US"/>
               <a:t>Click to edit Master title style</a:t>
             </a:r>
             <a:endParaRPr lang="en-US" dirty="0"/>
@@ -4601,7 +4607,7 @@
           <a:p>
             <a:fld id="{097649AC-CB8F-4FF1-9A34-5861C74DD0A7}" type="datetimeFigureOut">
               <a:rPr lang="en-US" dirty="0"/>
-              <a:t>7/16/2019</a:t>
+              <a:t>7/17/2019</a:t>
             </a:fld>
             <a:endParaRPr lang="en-US" dirty="0"/>
           </a:p>
@@ -4691,7 +4697,7 @@
           <a:p>
             <a:fld id="{3EC5CECA-2D3A-4680-9B49-752200DE467C}" type="datetimeFigureOut">
               <a:rPr lang="en-US" dirty="0"/>
-              <a:t>7/16/2019</a:t>
+              <a:t>7/17/2019</a:t>
             </a:fld>
             <a:endParaRPr lang="en-US" dirty="0"/>
           </a:p>
@@ -4791,7 +4797,7 @@
           </a:lstStyle>
           <a:p>
             <a:r>
-              <a:rPr lang="en-US" smtClean="0"/>
+              <a:rPr lang="en-US"/>
               <a:t>Click to edit Master title style</a:t>
             </a:r>
             <a:endParaRPr lang="en-US" dirty="0"/>
@@ -4820,35 +4826,35 @@
           <a:p>
             <a:pPr lvl="0"/>
             <a:r>
-              <a:rPr lang="en-US" smtClean="0"/>
+              <a:rPr lang="en-US"/>
               <a:t>Click to edit Master text styles</a:t>
             </a:r>
           </a:p>
           <a:p>
             <a:pPr lvl="1"/>
             <a:r>
-              <a:rPr lang="en-US" smtClean="0"/>
+              <a:rPr lang="en-US"/>
               <a:t>Second level</a:t>
             </a:r>
           </a:p>
           <a:p>
             <a:pPr lvl="2"/>
             <a:r>
-              <a:rPr lang="en-US" smtClean="0"/>
+              <a:rPr lang="en-US"/>
               <a:t>Third level</a:t>
             </a:r>
           </a:p>
           <a:p>
             <a:pPr lvl="3"/>
             <a:r>
-              <a:rPr lang="en-US" smtClean="0"/>
+              <a:rPr lang="en-US"/>
               <a:t>Fourth level</a:t>
             </a:r>
           </a:p>
           <a:p>
             <a:pPr lvl="4"/>
             <a:r>
-              <a:rPr lang="en-US" smtClean="0"/>
+              <a:rPr lang="en-US"/>
               <a:t>Fifth level</a:t>
             </a:r>
             <a:endParaRPr lang="en-US" dirty="0"/>
@@ -4916,7 +4922,7 @@
           <a:p>
             <a:pPr lvl="0"/>
             <a:r>
-              <a:rPr lang="en-US" smtClean="0"/>
+              <a:rPr lang="en-US"/>
               <a:t>Click to edit Master text styles</a:t>
             </a:r>
           </a:p>
@@ -4939,7 +4945,7 @@
           <a:p>
             <a:fld id="{50C3BFE2-83B7-4B0A-B9D3-AB28331082B3}" type="datetimeFigureOut">
               <a:rPr lang="en-US" dirty="0"/>
-              <a:t>7/16/2019</a:t>
+              <a:t>7/17/2019</a:t>
             </a:fld>
             <a:endParaRPr lang="en-US" dirty="0"/>
           </a:p>
@@ -5039,7 +5045,7 @@
           </a:lstStyle>
           <a:p>
             <a:r>
-              <a:rPr lang="en-US" smtClean="0"/>
+              <a:rPr lang="en-US"/>
               <a:t>Click to edit Master title style</a:t>
             </a:r>
             <a:endParaRPr lang="en-US" dirty="0"/>
@@ -5112,7 +5118,7 @@
           </a:lstStyle>
           <a:p>
             <a:r>
-              <a:rPr lang="en-US" smtClean="0"/>
+              <a:rPr lang="en-US"/>
               <a:t>Click icon to add picture</a:t>
             </a:r>
             <a:endParaRPr lang="en-US" dirty="0"/>
@@ -5180,7 +5186,7 @@
           <a:p>
             <a:pPr lvl="0"/>
             <a:r>
-              <a:rPr lang="en-US" smtClean="0"/>
+              <a:rPr lang="en-US"/>
               <a:t>Click to edit Master text styles</a:t>
             </a:r>
           </a:p>
@@ -5203,7 +5209,7 @@
           <a:p>
             <a:fld id="{12EF78E3-FDA3-4D28-AAA2-0B81F349A39D}" type="datetimeFigureOut">
               <a:rPr lang="en-US" dirty="0"/>
-              <a:t>7/16/2019</a:t>
+              <a:t>7/17/2019</a:t>
             </a:fld>
             <a:endParaRPr lang="en-US" dirty="0"/>
           </a:p>
@@ -5497,7 +5503,7 @@
           <a:lstStyle/>
           <a:p>
             <a:r>
-              <a:rPr lang="en-US" smtClean="0"/>
+              <a:rPr lang="en-US"/>
               <a:t>Click to edit Master title style</a:t>
             </a:r>
             <a:endParaRPr lang="en-US" dirty="0"/>
@@ -5531,35 +5537,35 @@
           <a:p>
             <a:pPr lvl="0"/>
             <a:r>
-              <a:rPr lang="en-US" smtClean="0"/>
+              <a:rPr lang="en-US"/>
               <a:t>Click to edit Master text styles</a:t>
             </a:r>
           </a:p>
           <a:p>
             <a:pPr lvl="1"/>
             <a:r>
-              <a:rPr lang="en-US" smtClean="0"/>
+              <a:rPr lang="en-US"/>
               <a:t>Second level</a:t>
             </a:r>
           </a:p>
           <a:p>
             <a:pPr lvl="2"/>
             <a:r>
-              <a:rPr lang="en-US" smtClean="0"/>
+              <a:rPr lang="en-US"/>
               <a:t>Third level</a:t>
             </a:r>
           </a:p>
           <a:p>
             <a:pPr lvl="3"/>
             <a:r>
-              <a:rPr lang="en-US" smtClean="0"/>
+              <a:rPr lang="en-US"/>
               <a:t>Fourth level</a:t>
             </a:r>
           </a:p>
           <a:p>
             <a:pPr lvl="4"/>
             <a:r>
-              <a:rPr lang="en-US" smtClean="0"/>
+              <a:rPr lang="en-US"/>
               <a:t>Fifth level</a:t>
             </a:r>
             <a:endParaRPr lang="en-US" dirty="0"/>
@@ -5601,7 +5607,7 @@
           <a:p>
             <a:fld id="{C35BB1C6-BF8F-4481-8AB2-603A1C8A906A}" type="datetimeFigureOut">
               <a:rPr lang="en-US" dirty="0"/>
-              <a:t>7/16/2019</a:t>
+              <a:t>7/17/2019</a:t>
             </a:fld>
             <a:endParaRPr lang="en-US" dirty="0"/>
           </a:p>
@@ -6079,72 +6085,35 @@
           <a:p>
             <a:pPr algn="ctr"/>
             <a:r>
-              <a:rPr lang="en-US" u="sng" dirty="0" smtClean="0">
+              <a:rPr lang="en-US" u="sng" dirty="0">
                 <a:solidFill>
                   <a:srgbClr val="002060"/>
                 </a:solidFill>
               </a:rPr>
               <a:t>Big data analytics project</a:t>
             </a:r>
-            <a:r>
-              <a:rPr lang="en-US" dirty="0" smtClean="0">
-                <a:solidFill>
-                  <a:srgbClr val="002060"/>
-                </a:solidFill>
-              </a:rPr>
-              <a:t/>
-            </a:r>
             <a:br>
-              <a:rPr lang="en-US" dirty="0" smtClean="0">
+              <a:rPr lang="en-US" dirty="0">
                 <a:solidFill>
                   <a:srgbClr val="002060"/>
                 </a:solidFill>
               </a:rPr>
             </a:br>
-            <a:r>
-              <a:rPr lang="en-US" dirty="0" smtClean="0">
-                <a:solidFill>
-                  <a:srgbClr val="002060"/>
-                </a:solidFill>
-              </a:rPr>
-              <a:t/>
-            </a:r>
             <a:br>
-              <a:rPr lang="en-US" dirty="0" smtClean="0">
+              <a:rPr lang="en-US" dirty="0">
                 <a:solidFill>
                   <a:srgbClr val="002060"/>
                 </a:solidFill>
               </a:rPr>
             </a:br>
             <a:r>
-              <a:rPr lang="en-US" sz="5600" dirty="0" smtClean="0">
-                <a:solidFill>
-                  <a:srgbClr val="002060"/>
-                </a:solidFill>
-              </a:rPr>
-              <a:t>Amazon Customer </a:t>
-            </a:r>
-            <a:r>
               <a:rPr lang="en-US" sz="5600" dirty="0">
                 <a:solidFill>
                   <a:srgbClr val="002060"/>
                 </a:solidFill>
               </a:rPr>
-              <a:t>Reviews </a:t>
-            </a:r>
-            <a:r>
-              <a:rPr lang="en-US" sz="5600" dirty="0" smtClean="0">
-                <a:solidFill>
-                  <a:srgbClr val="002060"/>
-                </a:solidFill>
-              </a:rPr>
-              <a:t>Dataset </a:t>
-            </a:r>
-            <a:endParaRPr lang="en-US" sz="5600" dirty="0">
-              <a:solidFill>
-                <a:srgbClr val="002060"/>
-              </a:solidFill>
-            </a:endParaRPr>
+              <a:t>Amazon Customer Reviews Dataset </a:t>
+            </a:r>
           </a:p>
         </p:txBody>
       </p:sp>
@@ -6178,13 +6147,8 @@
             </a:r>
             <a:r>
               <a:rPr lang="en-US" dirty="0"/>
-              <a:t> Patel, and Archit </a:t>
-            </a:r>
-            <a:r>
-              <a:rPr lang="en-US" dirty="0" smtClean="0"/>
-              <a:t>Manuja</a:t>
-            </a:r>
-            <a:endParaRPr lang="en-US" dirty="0"/>
+              <a:t> Patel, and Archit Manuja</a:t>
+            </a:r>
           </a:p>
         </p:txBody>
       </p:sp>
@@ -6225,7 +6189,7 @@
             <a:spLocks noGrp="1"/>
           </p:cNvSpPr>
           <p:nvPr>
-            <p:ph type="title"/>
+            <p:ph type="ctrTitle"/>
           </p:nvPr>
         </p:nvSpPr>
         <p:spPr/>
@@ -6234,10 +6198,65 @@
           <a:lstStyle/>
           <a:p>
             <a:r>
-              <a:rPr lang="en-US" dirty="0" smtClean="0"/>
+              <a:rPr lang="en-US" dirty="0">
+                <a:solidFill>
+                  <a:srgbClr val="002060"/>
+                </a:solidFill>
+              </a:rPr>
+              <a:t>Logistic Model</a:t>
+            </a:r>
+          </a:p>
+        </p:txBody>
+      </p:sp>
+    </p:spTree>
+    <p:extLst>
+      <p:ext uri="{BB962C8B-B14F-4D97-AF65-F5344CB8AC3E}">
+        <p14:creationId xmlns:p14="http://schemas.microsoft.com/office/powerpoint/2010/main" val="4287023280"/>
+      </p:ext>
+    </p:extLst>
+  </p:cSld>
+  <p:clrMapOvr>
+    <a:masterClrMapping/>
+  </p:clrMapOvr>
+</p:sld>
+</file>
+
+<file path=ppt/slides/slide11.xml><?xml version="1.0" encoding="utf-8"?>
+<p:sld xmlns:a="http://schemas.openxmlformats.org/drawingml/2006/main" xmlns:r="http://schemas.openxmlformats.org/officeDocument/2006/relationships" xmlns:p="http://schemas.openxmlformats.org/presentationml/2006/main">
+  <p:cSld>
+    <p:spTree>
+      <p:nvGrpSpPr>
+        <p:cNvPr id="1" name=""/>
+        <p:cNvGrpSpPr/>
+        <p:nvPr/>
+      </p:nvGrpSpPr>
+      <p:grpSpPr>
+        <a:xfrm>
+          <a:off x="0" y="0"/>
+          <a:ext cx="0" cy="0"/>
+          <a:chOff x="0" y="0"/>
+          <a:chExt cx="0" cy="0"/>
+        </a:xfrm>
+      </p:grpSpPr>
+      <p:sp>
+        <p:nvSpPr>
+          <p:cNvPr id="2" name="Title 1"/>
+          <p:cNvSpPr>
+            <a:spLocks noGrp="1"/>
+          </p:cNvSpPr>
+          <p:nvPr>
+            <p:ph type="title"/>
+          </p:nvPr>
+        </p:nvSpPr>
+        <p:spPr/>
+        <p:txBody>
+          <a:bodyPr/>
+          <a:lstStyle/>
+          <a:p>
+            <a:r>
+              <a:rPr lang="en-US" dirty="0"/>
               <a:t>Model Variables/SCHEMA</a:t>
             </a:r>
-            <a:endParaRPr lang="en-US" dirty="0"/>
           </a:p>
         </p:txBody>
       </p:sp>
@@ -6278,7 +6297,7 @@
 </p:sld>
 </file>
 
-<file path=ppt/slides/slide11.xml><?xml version="1.0" encoding="utf-8"?>
+<file path=ppt/slides/slide12.xml><?xml version="1.0" encoding="utf-8"?>
 <p:sld xmlns:a="http://schemas.openxmlformats.org/drawingml/2006/main" xmlns:r="http://schemas.openxmlformats.org/officeDocument/2006/relationships" xmlns:p="http://schemas.openxmlformats.org/presentationml/2006/main">
   <p:cSld>
     <p:spTree>
@@ -6311,10 +6330,9 @@
           <a:lstStyle/>
           <a:p>
             <a:r>
-              <a:rPr lang="en-US" dirty="0" smtClean="0"/>
+              <a:rPr lang="en-US" dirty="0"/>
               <a:t>Model Comparison</a:t>
             </a:r>
-            <a:endParaRPr lang="en-US" dirty="0"/>
           </a:p>
         </p:txBody>
       </p:sp>
@@ -6343,10 +6361,34 @@
                 <a:tableStyleId>{EB9631B5-78F2-41C9-869B-9F39066F8104}</a:tableStyleId>
               </a:tblPr>
               <a:tblGrid>
-                <a:gridCol w="2670027"/>
-                <a:gridCol w="2670027"/>
-                <a:gridCol w="2670027"/>
-                <a:gridCol w="2670027"/>
+                <a:gridCol w="2670027">
+                  <a:extLst>
+                    <a:ext uri="{9D8B030D-6E8A-4147-A177-3AD203B41FA5}">
+                      <a16:colId xmlns:a16="http://schemas.microsoft.com/office/drawing/2014/main" val="20000"/>
+                    </a:ext>
+                  </a:extLst>
+                </a:gridCol>
+                <a:gridCol w="2670027">
+                  <a:extLst>
+                    <a:ext uri="{9D8B030D-6E8A-4147-A177-3AD203B41FA5}">
+                      <a16:colId xmlns:a16="http://schemas.microsoft.com/office/drawing/2014/main" val="20001"/>
+                    </a:ext>
+                  </a:extLst>
+                </a:gridCol>
+                <a:gridCol w="2670027">
+                  <a:extLst>
+                    <a:ext uri="{9D8B030D-6E8A-4147-A177-3AD203B41FA5}">
+                      <a16:colId xmlns:a16="http://schemas.microsoft.com/office/drawing/2014/main" val="20002"/>
+                    </a:ext>
+                  </a:extLst>
+                </a:gridCol>
+                <a:gridCol w="2670027">
+                  <a:extLst>
+                    <a:ext uri="{9D8B030D-6E8A-4147-A177-3AD203B41FA5}">
+                      <a16:colId xmlns:a16="http://schemas.microsoft.com/office/drawing/2014/main" val="20003"/>
+                    </a:ext>
+                  </a:extLst>
+                </a:gridCol>
               </a:tblGrid>
               <a:tr h="687298">
                 <a:tc>
@@ -6356,16 +6398,12 @@
                     <a:p>
                       <a:pPr algn="ctr"/>
                       <a:r>
-                        <a:rPr lang="en-US" sz="2400" dirty="0" smtClean="0">
+                        <a:rPr lang="en-US" sz="2400" dirty="0">
                           <a:latin typeface="Times New Roman" panose="02020603050405020304" pitchFamily="18" charset="0"/>
                           <a:cs typeface="Times New Roman" panose="02020603050405020304" pitchFamily="18" charset="0"/>
                         </a:rPr>
                         <a:t>CATEGORY</a:t>
                       </a:r>
-                      <a:endParaRPr lang="en-US" sz="2400" dirty="0">
-                        <a:latin typeface="Times New Roman" panose="02020603050405020304" pitchFamily="18" charset="0"/>
-                        <a:cs typeface="Times New Roman" panose="02020603050405020304" pitchFamily="18" charset="0"/>
-                      </a:endParaRPr>
                     </a:p>
                   </a:txBody>
                   <a:tcPr/>
@@ -6377,16 +6415,12 @@
                     <a:p>
                       <a:pPr algn="ctr"/>
                       <a:r>
-                        <a:rPr lang="en-US" sz="2400" dirty="0" smtClean="0">
+                        <a:rPr lang="en-US" sz="2400" dirty="0">
                           <a:latin typeface="Times New Roman" panose="02020603050405020304" pitchFamily="18" charset="0"/>
                           <a:cs typeface="Times New Roman" panose="02020603050405020304" pitchFamily="18" charset="0"/>
                         </a:rPr>
                         <a:t>AUC</a:t>
                       </a:r>
-                      <a:endParaRPr lang="en-US" sz="2400" dirty="0">
-                        <a:latin typeface="Times New Roman" panose="02020603050405020304" pitchFamily="18" charset="0"/>
-                        <a:cs typeface="Times New Roman" panose="02020603050405020304" pitchFamily="18" charset="0"/>
-                      </a:endParaRPr>
                     </a:p>
                   </a:txBody>
                   <a:tcPr/>
@@ -6398,16 +6432,12 @@
                     <a:p>
                       <a:pPr algn="ctr"/>
                       <a:r>
-                        <a:rPr lang="en-US" sz="2400" dirty="0" smtClean="0">
+                        <a:rPr lang="en-US" sz="2400" dirty="0">
                           <a:latin typeface="Times New Roman" panose="02020603050405020304" pitchFamily="18" charset="0"/>
                           <a:cs typeface="Times New Roman" panose="02020603050405020304" pitchFamily="18" charset="0"/>
                         </a:rPr>
                         <a:t>PRECISION</a:t>
                       </a:r>
-                      <a:endParaRPr lang="en-US" sz="2400" dirty="0">
-                        <a:latin typeface="Times New Roman" panose="02020603050405020304" pitchFamily="18" charset="0"/>
-                        <a:cs typeface="Times New Roman" panose="02020603050405020304" pitchFamily="18" charset="0"/>
-                      </a:endParaRPr>
                     </a:p>
                   </a:txBody>
                   <a:tcPr/>
@@ -6419,20 +6449,21 @@
                     <a:p>
                       <a:pPr algn="ctr"/>
                       <a:r>
-                        <a:rPr lang="en-US" sz="2400" dirty="0" smtClean="0">
+                        <a:rPr lang="en-US" sz="2400" dirty="0">
                           <a:latin typeface="Times New Roman" panose="02020603050405020304" pitchFamily="18" charset="0"/>
                           <a:cs typeface="Times New Roman" panose="02020603050405020304" pitchFamily="18" charset="0"/>
                         </a:rPr>
                         <a:t>ACCURACY</a:t>
                       </a:r>
-                      <a:endParaRPr lang="en-US" sz="2400" dirty="0">
-                        <a:latin typeface="Times New Roman" panose="02020603050405020304" pitchFamily="18" charset="0"/>
-                        <a:cs typeface="Times New Roman" panose="02020603050405020304" pitchFamily="18" charset="0"/>
-                      </a:endParaRPr>
                     </a:p>
                   </a:txBody>
                   <a:tcPr/>
                 </a:tc>
+                <a:extLst>
+                  <a:ext uri="{0D108BD9-81ED-4DB2-BD59-A6C34878D82A}">
+                    <a16:rowId xmlns:a16="http://schemas.microsoft.com/office/drawing/2014/main" val="10000"/>
+                  </a:ext>
+                </a:extLst>
               </a:tr>
               <a:tr h="687298">
                 <a:tc>
@@ -6442,16 +6473,12 @@
                     <a:p>
                       <a:pPr algn="ctr"/>
                       <a:r>
-                        <a:rPr lang="en-US" dirty="0" smtClean="0">
+                        <a:rPr lang="en-US" dirty="0">
                           <a:latin typeface="Times New Roman" panose="02020603050405020304" pitchFamily="18" charset="0"/>
                           <a:cs typeface="Times New Roman" panose="02020603050405020304" pitchFamily="18" charset="0"/>
                         </a:rPr>
                         <a:t>Books </a:t>
                       </a:r>
-                      <a:endParaRPr lang="en-US" dirty="0">
-                        <a:latin typeface="Times New Roman" panose="02020603050405020304" pitchFamily="18" charset="0"/>
-                        <a:cs typeface="Times New Roman" panose="02020603050405020304" pitchFamily="18" charset="0"/>
-                      </a:endParaRPr>
                     </a:p>
                   </a:txBody>
                   <a:tcPr anchor="ctr"/>
@@ -6463,16 +6490,12 @@
                     <a:p>
                       <a:pPr algn="ctr"/>
                       <a:r>
-                        <a:rPr lang="en-US" dirty="0" smtClean="0">
+                        <a:rPr lang="en-US" dirty="0">
                           <a:latin typeface="Times New Roman" panose="02020603050405020304" pitchFamily="18" charset="0"/>
                           <a:cs typeface="Times New Roman" panose="02020603050405020304" pitchFamily="18" charset="0"/>
                         </a:rPr>
                         <a:t>0.51</a:t>
                       </a:r>
-                      <a:endParaRPr lang="en-US" dirty="0">
-                        <a:latin typeface="Times New Roman" panose="02020603050405020304" pitchFamily="18" charset="0"/>
-                        <a:cs typeface="Times New Roman" panose="02020603050405020304" pitchFamily="18" charset="0"/>
-                      </a:endParaRPr>
                     </a:p>
                   </a:txBody>
                   <a:tcPr anchor="ctr"/>
@@ -6484,16 +6507,12 @@
                     <a:p>
                       <a:pPr algn="ctr"/>
                       <a:r>
-                        <a:rPr lang="en-US" dirty="0" smtClean="0">
+                        <a:rPr lang="en-US" dirty="0">
                           <a:latin typeface="Times New Roman" panose="02020603050405020304" pitchFamily="18" charset="0"/>
                           <a:cs typeface="Times New Roman" panose="02020603050405020304" pitchFamily="18" charset="0"/>
                         </a:rPr>
                         <a:t>0.42</a:t>
                       </a:r>
-                      <a:endParaRPr lang="en-US" dirty="0">
-                        <a:latin typeface="Times New Roman" panose="02020603050405020304" pitchFamily="18" charset="0"/>
-                        <a:cs typeface="Times New Roman" panose="02020603050405020304" pitchFamily="18" charset="0"/>
-                      </a:endParaRPr>
                     </a:p>
                   </a:txBody>
                   <a:tcPr anchor="ctr"/>
@@ -6505,20 +6524,21 @@
                     <a:p>
                       <a:pPr algn="ctr"/>
                       <a:r>
-                        <a:rPr lang="en-US" dirty="0" smtClean="0">
+                        <a:rPr lang="en-US" dirty="0">
                           <a:latin typeface="Times New Roman" panose="02020603050405020304" pitchFamily="18" charset="0"/>
                           <a:cs typeface="Times New Roman" panose="02020603050405020304" pitchFamily="18" charset="0"/>
                         </a:rPr>
                         <a:t>0.65</a:t>
                       </a:r>
-                      <a:endParaRPr lang="en-US" dirty="0">
-                        <a:latin typeface="Times New Roman" panose="02020603050405020304" pitchFamily="18" charset="0"/>
-                        <a:cs typeface="Times New Roman" panose="02020603050405020304" pitchFamily="18" charset="0"/>
-                      </a:endParaRPr>
                     </a:p>
                   </a:txBody>
                   <a:tcPr anchor="ctr"/>
                 </a:tc>
+                <a:extLst>
+                  <a:ext uri="{0D108BD9-81ED-4DB2-BD59-A6C34878D82A}">
+                    <a16:rowId xmlns:a16="http://schemas.microsoft.com/office/drawing/2014/main" val="10001"/>
+                  </a:ext>
+                </a:extLst>
               </a:tr>
               <a:tr h="687298">
                 <a:tc>
@@ -6528,16 +6548,12 @@
                     <a:p>
                       <a:pPr algn="ctr"/>
                       <a:r>
-                        <a:rPr lang="en-US" dirty="0" smtClean="0">
+                        <a:rPr lang="en-US" dirty="0">
                           <a:latin typeface="Times New Roman" panose="02020603050405020304" pitchFamily="18" charset="0"/>
                           <a:cs typeface="Times New Roman" panose="02020603050405020304" pitchFamily="18" charset="0"/>
                         </a:rPr>
                         <a:t>Electronics</a:t>
                       </a:r>
-                      <a:endParaRPr lang="en-US" dirty="0">
-                        <a:latin typeface="Times New Roman" panose="02020603050405020304" pitchFamily="18" charset="0"/>
-                        <a:cs typeface="Times New Roman" panose="02020603050405020304" pitchFamily="18" charset="0"/>
-                      </a:endParaRPr>
                     </a:p>
                   </a:txBody>
                   <a:tcPr anchor="ctr"/>
@@ -6549,16 +6565,12 @@
                     <a:p>
                       <a:pPr algn="ctr"/>
                       <a:r>
-                        <a:rPr lang="en-US" dirty="0" smtClean="0">
+                        <a:rPr lang="en-US" dirty="0">
                           <a:latin typeface="Times New Roman" panose="02020603050405020304" pitchFamily="18" charset="0"/>
                           <a:cs typeface="Times New Roman" panose="02020603050405020304" pitchFamily="18" charset="0"/>
                         </a:rPr>
                         <a:t>0.90</a:t>
                       </a:r>
-                      <a:endParaRPr lang="en-US" dirty="0">
-                        <a:latin typeface="Times New Roman" panose="02020603050405020304" pitchFamily="18" charset="0"/>
-                        <a:cs typeface="Times New Roman" panose="02020603050405020304" pitchFamily="18" charset="0"/>
-                      </a:endParaRPr>
                     </a:p>
                   </a:txBody>
                   <a:tcPr anchor="ctr"/>
@@ -6570,16 +6582,12 @@
                     <a:p>
                       <a:pPr algn="ctr"/>
                       <a:r>
-                        <a:rPr lang="en-US" dirty="0" smtClean="0">
+                        <a:rPr lang="en-US" dirty="0">
                           <a:latin typeface="Times New Roman" panose="02020603050405020304" pitchFamily="18" charset="0"/>
                           <a:cs typeface="Times New Roman" panose="02020603050405020304" pitchFamily="18" charset="0"/>
                         </a:rPr>
                         <a:t>0.86</a:t>
                       </a:r>
-                      <a:endParaRPr lang="en-US" dirty="0">
-                        <a:latin typeface="Times New Roman" panose="02020603050405020304" pitchFamily="18" charset="0"/>
-                        <a:cs typeface="Times New Roman" panose="02020603050405020304" pitchFamily="18" charset="0"/>
-                      </a:endParaRPr>
                     </a:p>
                   </a:txBody>
                   <a:tcPr anchor="ctr"/>
@@ -6591,20 +6599,21 @@
                     <a:p>
                       <a:pPr algn="ctr"/>
                       <a:r>
-                        <a:rPr lang="en-US" dirty="0" smtClean="0">
+                        <a:rPr lang="en-US" dirty="0">
                           <a:latin typeface="Times New Roman" panose="02020603050405020304" pitchFamily="18" charset="0"/>
                           <a:cs typeface="Times New Roman" panose="02020603050405020304" pitchFamily="18" charset="0"/>
                         </a:rPr>
                         <a:t>0.94</a:t>
                       </a:r>
-                      <a:endParaRPr lang="en-US" dirty="0">
-                        <a:latin typeface="Times New Roman" panose="02020603050405020304" pitchFamily="18" charset="0"/>
-                        <a:cs typeface="Times New Roman" panose="02020603050405020304" pitchFamily="18" charset="0"/>
-                      </a:endParaRPr>
                     </a:p>
                   </a:txBody>
                   <a:tcPr anchor="ctr"/>
                 </a:tc>
+                <a:extLst>
+                  <a:ext uri="{0D108BD9-81ED-4DB2-BD59-A6C34878D82A}">
+                    <a16:rowId xmlns:a16="http://schemas.microsoft.com/office/drawing/2014/main" val="10002"/>
+                  </a:ext>
+                </a:extLst>
               </a:tr>
               <a:tr h="687298">
                 <a:tc>
@@ -6614,16 +6623,12 @@
                     <a:p>
                       <a:pPr algn="ctr"/>
                       <a:r>
-                        <a:rPr lang="en-US" dirty="0" smtClean="0">
+                        <a:rPr lang="en-US" dirty="0">
                           <a:latin typeface="Times New Roman" panose="02020603050405020304" pitchFamily="18" charset="0"/>
                           <a:cs typeface="Times New Roman" panose="02020603050405020304" pitchFamily="18" charset="0"/>
                         </a:rPr>
                         <a:t>Kitchen</a:t>
                       </a:r>
-                      <a:endParaRPr lang="en-US" dirty="0">
-                        <a:latin typeface="Times New Roman" panose="02020603050405020304" pitchFamily="18" charset="0"/>
-                        <a:cs typeface="Times New Roman" panose="02020603050405020304" pitchFamily="18" charset="0"/>
-                      </a:endParaRPr>
                     </a:p>
                   </a:txBody>
                   <a:tcPr anchor="ctr"/>
@@ -6635,16 +6640,12 @@
                     <a:p>
                       <a:pPr algn="ctr"/>
                       <a:r>
-                        <a:rPr lang="en-US" dirty="0" smtClean="0">
+                        <a:rPr lang="en-US" dirty="0">
                           <a:latin typeface="Times New Roman" panose="02020603050405020304" pitchFamily="18" charset="0"/>
                           <a:cs typeface="Times New Roman" panose="02020603050405020304" pitchFamily="18" charset="0"/>
                         </a:rPr>
                         <a:t>0.96</a:t>
                       </a:r>
-                      <a:endParaRPr lang="en-US" dirty="0">
-                        <a:latin typeface="Times New Roman" panose="02020603050405020304" pitchFamily="18" charset="0"/>
-                        <a:cs typeface="Times New Roman" panose="02020603050405020304" pitchFamily="18" charset="0"/>
-                      </a:endParaRPr>
                     </a:p>
                   </a:txBody>
                   <a:tcPr anchor="ctr"/>
@@ -6656,16 +6657,12 @@
                     <a:p>
                       <a:pPr algn="ctr"/>
                       <a:r>
-                        <a:rPr lang="en-US" dirty="0" smtClean="0">
+                        <a:rPr lang="en-US" dirty="0">
                           <a:latin typeface="Times New Roman" panose="02020603050405020304" pitchFamily="18" charset="0"/>
                           <a:cs typeface="Times New Roman" panose="02020603050405020304" pitchFamily="18" charset="0"/>
                         </a:rPr>
                         <a:t>0.94</a:t>
                       </a:r>
-                      <a:endParaRPr lang="en-US" dirty="0">
-                        <a:latin typeface="Times New Roman" panose="02020603050405020304" pitchFamily="18" charset="0"/>
-                        <a:cs typeface="Times New Roman" panose="02020603050405020304" pitchFamily="18" charset="0"/>
-                      </a:endParaRPr>
                     </a:p>
                   </a:txBody>
                   <a:tcPr anchor="ctr"/>
@@ -6677,20 +6674,21 @@
                     <a:p>
                       <a:pPr algn="ctr"/>
                       <a:r>
-                        <a:rPr lang="en-US" dirty="0" smtClean="0">
+                        <a:rPr lang="en-US" dirty="0">
                           <a:latin typeface="Times New Roman" panose="02020603050405020304" pitchFamily="18" charset="0"/>
                           <a:cs typeface="Times New Roman" panose="02020603050405020304" pitchFamily="18" charset="0"/>
                         </a:rPr>
                         <a:t>0.97</a:t>
                       </a:r>
-                      <a:endParaRPr lang="en-US" dirty="0">
-                        <a:latin typeface="Times New Roman" panose="02020603050405020304" pitchFamily="18" charset="0"/>
-                        <a:cs typeface="Times New Roman" panose="02020603050405020304" pitchFamily="18" charset="0"/>
-                      </a:endParaRPr>
                     </a:p>
                   </a:txBody>
                   <a:tcPr anchor="ctr"/>
                 </a:tc>
+                <a:extLst>
+                  <a:ext uri="{0D108BD9-81ED-4DB2-BD59-A6C34878D82A}">
+                    <a16:rowId xmlns:a16="http://schemas.microsoft.com/office/drawing/2014/main" val="10003"/>
+                  </a:ext>
+                </a:extLst>
               </a:tr>
             </a:tbl>
           </a:graphicData>
@@ -6709,7 +6707,7 @@
 </p:sld>
 </file>
 
-<file path=ppt/slides/slide12.xml><?xml version="1.0" encoding="utf-8"?>
+<file path=ppt/slides/slide13.xml><?xml version="1.0" encoding="utf-8"?>
 <p:sld xmlns:a="http://schemas.openxmlformats.org/drawingml/2006/main" xmlns:r="http://schemas.openxmlformats.org/officeDocument/2006/relationships" xmlns:p="http://schemas.openxmlformats.org/presentationml/2006/main">
   <p:cSld>
     <p:spTree>
@@ -6742,18 +6740,13 @@
           <a:lstStyle/>
           <a:p>
             <a:r>
-              <a:rPr lang="en-US" dirty="0" smtClean="0">
+              <a:rPr lang="en-US" dirty="0">
                 <a:solidFill>
                   <a:srgbClr val="002060"/>
                 </a:solidFill>
               </a:rPr>
               <a:t>Questions?</a:t>
             </a:r>
-            <a:endParaRPr lang="en-US" dirty="0">
-              <a:solidFill>
-                <a:srgbClr val="002060"/>
-              </a:solidFill>
-            </a:endParaRPr>
           </a:p>
         </p:txBody>
       </p:sp>
@@ -6803,10 +6796,9 @@
           <a:lstStyle/>
           <a:p>
             <a:r>
-              <a:rPr lang="en-US" dirty="0" smtClean="0"/>
+              <a:rPr lang="en-US" dirty="0"/>
               <a:t>Dataset Variables </a:t>
             </a:r>
-            <a:endParaRPr lang="en-US" dirty="0"/>
           </a:p>
         </p:txBody>
       </p:sp>
@@ -6878,10 +6870,9 @@
           <a:lstStyle/>
           <a:p>
             <a:r>
-              <a:rPr lang="en-US" dirty="0" smtClean="0"/>
+              <a:rPr lang="en-US" dirty="0"/>
               <a:t>New Variables created</a:t>
             </a:r>
-            <a:endParaRPr lang="en-US" dirty="0"/>
           </a:p>
         </p:txBody>
       </p:sp>
@@ -6903,27 +6894,27 @@
           <a:lstStyle/>
           <a:p>
             <a:r>
-              <a:rPr lang="en-US" b="1" cap="none" dirty="0" smtClean="0">
+              <a:rPr lang="en-US" b="1" cap="none" dirty="0">
                 <a:latin typeface="Times New Roman" panose="02020603050405020304" pitchFamily="18" charset="0"/>
                 <a:cs typeface="Times New Roman" panose="02020603050405020304" pitchFamily="18" charset="0"/>
               </a:rPr>
               <a:t>Review polarity</a:t>
             </a:r>
             <a:r>
-              <a:rPr lang="en-US" cap="none" dirty="0" smtClean="0">
+              <a:rPr lang="en-US" cap="none" dirty="0">
                 <a:latin typeface="Times New Roman" panose="02020603050405020304" pitchFamily="18" charset="0"/>
                 <a:cs typeface="Times New Roman" panose="02020603050405020304" pitchFamily="18" charset="0"/>
               </a:rPr>
               <a:t> - using </a:t>
             </a:r>
             <a:r>
-              <a:rPr lang="en-US" cap="none" dirty="0" err="1" smtClean="0">
+              <a:rPr lang="en-US" cap="none" dirty="0" err="1">
                 <a:latin typeface="Times New Roman" panose="02020603050405020304" pitchFamily="18" charset="0"/>
                 <a:cs typeface="Times New Roman" panose="02020603050405020304" pitchFamily="18" charset="0"/>
               </a:rPr>
               <a:t>textblob</a:t>
             </a:r>
-            <a:endParaRPr lang="en-US" cap="none" dirty="0" smtClean="0">
+            <a:endParaRPr lang="en-US" cap="none" dirty="0">
               <a:latin typeface="Times New Roman" panose="02020603050405020304" pitchFamily="18" charset="0"/>
               <a:cs typeface="Times New Roman" panose="02020603050405020304" pitchFamily="18" charset="0"/>
             </a:endParaRPr>
@@ -6931,7 +6922,7 @@
           <a:p>
             <a:pPr lvl="1"/>
             <a:r>
-              <a:rPr lang="en-US" sz="2000" cap="none" dirty="0" smtClean="0">
+              <a:rPr lang="en-US" sz="2000" cap="none" dirty="0">
                 <a:latin typeface="Times New Roman" panose="02020603050405020304" pitchFamily="18" charset="0"/>
                 <a:cs typeface="Times New Roman" panose="02020603050405020304" pitchFamily="18" charset="0"/>
               </a:rPr>
@@ -6945,40 +6936,33 @@
                 <a:latin typeface="Times New Roman" panose="02020603050405020304" pitchFamily="18" charset="0"/>
                 <a:cs typeface="Times New Roman" panose="02020603050405020304" pitchFamily="18" charset="0"/>
               </a:rPr>
-              <a:t>b</a:t>
-            </a:r>
-            <a:r>
-              <a:rPr lang="en-US" sz="2000" cap="none" dirty="0" smtClean="0">
-                <a:latin typeface="Times New Roman" panose="02020603050405020304" pitchFamily="18" charset="0"/>
-                <a:cs typeface="Times New Roman" panose="02020603050405020304" pitchFamily="18" charset="0"/>
-              </a:rPr>
-              <a:t>ody_polarity</a:t>
-            </a:r>
-          </a:p>
-          <a:p>
-            <a:r>
-              <a:rPr lang="en-US" b="1" cap="none" dirty="0" smtClean="0">
+              <a:t>body_polarity</a:t>
+            </a:r>
+          </a:p>
+          <a:p>
+            <a:r>
+              <a:rPr lang="en-US" b="1" cap="none" dirty="0">
                 <a:latin typeface="Times New Roman" panose="02020603050405020304" pitchFamily="18" charset="0"/>
                 <a:cs typeface="Times New Roman" panose="02020603050405020304" pitchFamily="18" charset="0"/>
               </a:rPr>
               <a:t>Review length </a:t>
             </a:r>
             <a:r>
-              <a:rPr lang="en-US" cap="none" dirty="0" smtClean="0">
+              <a:rPr lang="en-US" cap="none" dirty="0">
                 <a:latin typeface="Times New Roman" panose="02020603050405020304" pitchFamily="18" charset="0"/>
                 <a:cs typeface="Times New Roman" panose="02020603050405020304" pitchFamily="18" charset="0"/>
               </a:rPr>
               <a:t>- using </a:t>
             </a:r>
             <a:r>
-              <a:rPr lang="en-US" cap="none" dirty="0" err="1" smtClean="0">
+              <a:rPr lang="en-US" cap="none" dirty="0" err="1">
                 <a:latin typeface="Times New Roman" panose="02020603050405020304" pitchFamily="18" charset="0"/>
                 <a:cs typeface="Times New Roman" panose="02020603050405020304" pitchFamily="18" charset="0"/>
               </a:rPr>
               <a:t>len</a:t>
             </a:r>
             <a:r>
-              <a:rPr lang="en-US" cap="none" dirty="0" smtClean="0">
+              <a:rPr lang="en-US" cap="none" dirty="0">
                 <a:latin typeface="Times New Roman" panose="02020603050405020304" pitchFamily="18" charset="0"/>
                 <a:cs typeface="Times New Roman" panose="02020603050405020304" pitchFamily="18" charset="0"/>
               </a:rPr>
@@ -6988,7 +6972,7 @@
           <a:p>
             <a:pPr lvl="1"/>
             <a:r>
-              <a:rPr lang="en-US" sz="2000" cap="none" dirty="0" err="1" smtClean="0">
+              <a:rPr lang="en-US" sz="2000" cap="none" dirty="0" err="1">
                 <a:latin typeface="Times New Roman" panose="02020603050405020304" pitchFamily="18" charset="0"/>
                 <a:cs typeface="Times New Roman" panose="02020603050405020304" pitchFamily="18" charset="0"/>
               </a:rPr>
@@ -7002,62 +6986,62 @@
           <a:p>
             <a:pPr lvl="1"/>
             <a:r>
-              <a:rPr lang="en-US" sz="2000" cap="none" dirty="0" err="1" smtClean="0">
+              <a:rPr lang="en-US" sz="2000" cap="none" dirty="0" err="1">
                 <a:latin typeface="Times New Roman" panose="02020603050405020304" pitchFamily="18" charset="0"/>
                 <a:cs typeface="Times New Roman" panose="02020603050405020304" pitchFamily="18" charset="0"/>
               </a:rPr>
               <a:t>body_length</a:t>
             </a:r>
-            <a:endParaRPr lang="en-US" sz="2000" cap="none" dirty="0" smtClean="0">
+            <a:endParaRPr lang="en-US" sz="2000" cap="none" dirty="0">
               <a:latin typeface="Times New Roman" panose="02020603050405020304" pitchFamily="18" charset="0"/>
               <a:cs typeface="Times New Roman" panose="02020603050405020304" pitchFamily="18" charset="0"/>
             </a:endParaRPr>
           </a:p>
           <a:p>
             <a:r>
-              <a:rPr lang="en-US" b="1" cap="none" dirty="0" err="1" smtClean="0">
+              <a:rPr lang="en-US" b="1" cap="none" dirty="0" err="1">
                 <a:latin typeface="Times New Roman" panose="02020603050405020304" pitchFamily="18" charset="0"/>
                 <a:cs typeface="Times New Roman" panose="02020603050405020304" pitchFamily="18" charset="0"/>
               </a:rPr>
               <a:t>helpful_ratio</a:t>
             </a:r>
             <a:r>
-              <a:rPr lang="en-US" b="1" cap="none" dirty="0" smtClean="0">
+              <a:rPr lang="en-US" b="1" cap="none" dirty="0">
                 <a:latin typeface="Times New Roman" panose="02020603050405020304" pitchFamily="18" charset="0"/>
                 <a:cs typeface="Times New Roman" panose="02020603050405020304" pitchFamily="18" charset="0"/>
               </a:rPr>
               <a:t> </a:t>
             </a:r>
             <a:r>
-              <a:rPr lang="en-US" cap="none" dirty="0" smtClean="0">
+              <a:rPr lang="en-US" cap="none" dirty="0">
                 <a:latin typeface="Times New Roman" panose="02020603050405020304" pitchFamily="18" charset="0"/>
                 <a:cs typeface="Times New Roman" panose="02020603050405020304" pitchFamily="18" charset="0"/>
               </a:rPr>
               <a:t>- (</a:t>
             </a:r>
             <a:r>
-              <a:rPr lang="en-US" cap="none" dirty="0" err="1" smtClean="0">
+              <a:rPr lang="en-US" cap="none" dirty="0" err="1">
                 <a:latin typeface="Times New Roman" panose="02020603050405020304" pitchFamily="18" charset="0"/>
                 <a:cs typeface="Times New Roman" panose="02020603050405020304" pitchFamily="18" charset="0"/>
               </a:rPr>
               <a:t>helpful_votes</a:t>
             </a:r>
             <a:r>
-              <a:rPr lang="en-US" cap="none" dirty="0" smtClean="0">
+              <a:rPr lang="en-US" cap="none" dirty="0">
                 <a:latin typeface="Times New Roman" panose="02020603050405020304" pitchFamily="18" charset="0"/>
                 <a:cs typeface="Times New Roman" panose="02020603050405020304" pitchFamily="18" charset="0"/>
               </a:rPr>
               <a:t>/</a:t>
             </a:r>
             <a:r>
-              <a:rPr lang="en-US" cap="none" dirty="0" err="1" smtClean="0">
+              <a:rPr lang="en-US" cap="none" dirty="0" err="1">
                 <a:latin typeface="Times New Roman" panose="02020603050405020304" pitchFamily="18" charset="0"/>
                 <a:cs typeface="Times New Roman" panose="02020603050405020304" pitchFamily="18" charset="0"/>
               </a:rPr>
               <a:t>total_votes</a:t>
             </a:r>
             <a:r>
-              <a:rPr lang="en-US" cap="none" dirty="0" smtClean="0">
+              <a:rPr lang="en-US" cap="none" dirty="0">
                 <a:latin typeface="Times New Roman" panose="02020603050405020304" pitchFamily="18" charset="0"/>
                 <a:cs typeface="Times New Roman" panose="02020603050405020304" pitchFamily="18" charset="0"/>
               </a:rPr>
@@ -7066,28 +7050,28 @@
           </a:p>
           <a:p>
             <a:r>
-              <a:rPr lang="en-US" b="1" cap="none" dirty="0" smtClean="0">
+              <a:rPr lang="en-US" b="1" cap="none" dirty="0">
                 <a:latin typeface="Times New Roman" panose="02020603050405020304" pitchFamily="18" charset="0"/>
                 <a:cs typeface="Times New Roman" panose="02020603050405020304" pitchFamily="18" charset="0"/>
               </a:rPr>
               <a:t>helpful? </a:t>
             </a:r>
             <a:r>
-              <a:rPr lang="en-US" cap="none" dirty="0" smtClean="0">
+              <a:rPr lang="en-US" cap="none" dirty="0">
                 <a:latin typeface="Times New Roman" panose="02020603050405020304" pitchFamily="18" charset="0"/>
                 <a:cs typeface="Times New Roman" panose="02020603050405020304" pitchFamily="18" charset="0"/>
               </a:rPr>
               <a:t>- </a:t>
             </a:r>
             <a:r>
-              <a:rPr lang="en-US" cap="none" dirty="0" err="1" smtClean="0">
+              <a:rPr lang="en-US" cap="none" dirty="0" err="1">
                 <a:latin typeface="Times New Roman" panose="02020603050405020304" pitchFamily="18" charset="0"/>
                 <a:cs typeface="Times New Roman" panose="02020603050405020304" pitchFamily="18" charset="0"/>
               </a:rPr>
               <a:t>helpful_ratio</a:t>
             </a:r>
             <a:r>
-              <a:rPr lang="en-US" cap="none" dirty="0" smtClean="0">
+              <a:rPr lang="en-US" cap="none" dirty="0">
                 <a:latin typeface="Times New Roman" panose="02020603050405020304" pitchFamily="18" charset="0"/>
                 <a:cs typeface="Times New Roman" panose="02020603050405020304" pitchFamily="18" charset="0"/>
               </a:rPr>
@@ -7142,18 +7126,13 @@
           <a:lstStyle/>
           <a:p>
             <a:r>
-              <a:rPr lang="en-US" dirty="0" smtClean="0">
+              <a:rPr lang="en-US" dirty="0">
                 <a:solidFill>
                   <a:srgbClr val="002060"/>
                 </a:solidFill>
               </a:rPr>
               <a:t>Data exploration </a:t>
             </a:r>
-            <a:endParaRPr lang="en-US" dirty="0">
-              <a:solidFill>
-                <a:srgbClr val="002060"/>
-              </a:solidFill>
-            </a:endParaRPr>
           </a:p>
         </p:txBody>
       </p:sp>
@@ -7203,10 +7182,9 @@
           <a:lstStyle/>
           <a:p>
             <a:r>
-              <a:rPr lang="en-US" dirty="0" smtClean="0"/>
+              <a:rPr lang="en-US" dirty="0"/>
               <a:t>Data Exploration – “Books”</a:t>
             </a:r>
-            <a:endParaRPr lang="en-US" dirty="0"/>
           </a:p>
         </p:txBody>
       </p:sp>
@@ -7280,10 +7258,9 @@
           <a:lstStyle/>
           <a:p>
             <a:r>
-              <a:rPr lang="en-US" dirty="0" smtClean="0"/>
+              <a:rPr lang="en-US" dirty="0"/>
               <a:t>Data Exploration – “Electronics”</a:t>
             </a:r>
-            <a:endParaRPr lang="en-US" dirty="0"/>
           </a:p>
         </p:txBody>
       </p:sp>
@@ -7357,18 +7334,17 @@
           <a:lstStyle/>
           <a:p>
             <a:r>
-              <a:rPr lang="en-US" dirty="0" smtClean="0"/>
+              <a:rPr lang="en-US" dirty="0"/>
               <a:t>Data Exploration – “</a:t>
             </a:r>
             <a:r>
-              <a:rPr lang="en-US" dirty="0" err="1" smtClean="0"/>
+              <a:rPr lang="en-US" dirty="0" err="1"/>
               <a:t>kITCHEN</a:t>
             </a:r>
             <a:r>
-              <a:rPr lang="en-US" dirty="0" smtClean="0"/>
+              <a:rPr lang="en-US" dirty="0"/>
               <a:t>”</a:t>
             </a:r>
-            <a:endParaRPr lang="en-US" dirty="0"/>
           </a:p>
         </p:txBody>
       </p:sp>
@@ -7442,97 +7418,123 @@
           <a:lstStyle/>
           <a:p>
             <a:r>
-              <a:rPr lang="en-US" dirty="0" smtClean="0"/>
+              <a:rPr lang="en-US" dirty="0"/>
               <a:t>Data Exploration – GRAPHS</a:t>
             </a:r>
-            <a:endParaRPr lang="en-US" dirty="0"/>
-          </a:p>
-        </p:txBody>
-      </p:sp>
-      <p:sp>
-        <p:nvSpPr>
-          <p:cNvPr id="8" name="Content Placeholder 2"/>
-          <p:cNvSpPr>
-            <a:spLocks noGrp="1"/>
-          </p:cNvSpPr>
-          <p:nvPr>
-            <p:ph sz="quarter" idx="13"/>
-          </p:nvPr>
-        </p:nvSpPr>
+          </a:p>
+        </p:txBody>
+      </p:sp>
+      <p:grpSp>
+        <p:nvGrpSpPr>
+          <p:cNvPr id="11" name="Group 10">
+            <a:extLst>
+              <a:ext uri="{FF2B5EF4-FFF2-40B4-BE49-F238E27FC236}">
+                <a16:creationId xmlns:a16="http://schemas.microsoft.com/office/drawing/2014/main" id="{803DA526-316D-415B-AF88-682815852BDE}"/>
+              </a:ext>
+            </a:extLst>
+          </p:cNvPr>
+          <p:cNvGrpSpPr/>
+          <p:nvPr/>
+        </p:nvGrpSpPr>
+        <p:grpSpPr>
+          <a:xfrm>
+            <a:off x="6229177" y="1742871"/>
+            <a:ext cx="3196813" cy="3695845"/>
+            <a:chOff x="742778" y="1744374"/>
+            <a:chExt cx="3196813" cy="3695845"/>
+          </a:xfrm>
+        </p:grpSpPr>
+        <p:pic>
+          <p:nvPicPr>
+            <p:cNvPr id="6" name="Picture 5">
+              <a:extLst>
+                <a:ext uri="{FF2B5EF4-FFF2-40B4-BE49-F238E27FC236}">
+                  <a16:creationId xmlns:a16="http://schemas.microsoft.com/office/drawing/2014/main" id="{78672C50-B597-40BA-ACA7-402488982C02}"/>
+                </a:ext>
+              </a:extLst>
+            </p:cNvPr>
+            <p:cNvPicPr>
+              <a:picLocks noChangeAspect="1"/>
+            </p:cNvPicPr>
+            <p:nvPr/>
+          </p:nvPicPr>
+          <p:blipFill>
+            <a:blip r:embed="rId2"/>
+            <a:stretch>
+              <a:fillRect/>
+            </a:stretch>
+          </p:blipFill>
+          <p:spPr>
+            <a:xfrm>
+              <a:off x="2587041" y="1744374"/>
+              <a:ext cx="1352550" cy="733425"/>
+            </a:xfrm>
+            <a:prstGeom prst="rect">
+              <a:avLst/>
+            </a:prstGeom>
+          </p:spPr>
+        </p:pic>
+        <p:pic>
+          <p:nvPicPr>
+            <p:cNvPr id="7" name="Picture 6">
+              <a:extLst>
+                <a:ext uri="{FF2B5EF4-FFF2-40B4-BE49-F238E27FC236}">
+                  <a16:creationId xmlns:a16="http://schemas.microsoft.com/office/drawing/2014/main" id="{2D844226-0769-40CF-B9DA-9DAEBDD88EE4}"/>
+                </a:ext>
+              </a:extLst>
+            </p:cNvPr>
+            <p:cNvPicPr>
+              <a:picLocks noChangeAspect="1"/>
+            </p:cNvPicPr>
+            <p:nvPr/>
+          </p:nvPicPr>
+          <p:blipFill>
+            <a:blip r:embed="rId3"/>
+            <a:stretch>
+              <a:fillRect/>
+            </a:stretch>
+          </p:blipFill>
+          <p:spPr>
+            <a:xfrm>
+              <a:off x="742778" y="1744374"/>
+              <a:ext cx="1844263" cy="3695845"/>
+            </a:xfrm>
+            <a:prstGeom prst="rect">
+              <a:avLst/>
+            </a:prstGeom>
+          </p:spPr>
+        </p:pic>
+      </p:grpSp>
+      <p:pic>
+        <p:nvPicPr>
+          <p:cNvPr id="10" name="Picture 9">
+            <a:extLst>
+              <a:ext uri="{FF2B5EF4-FFF2-40B4-BE49-F238E27FC236}">
+                <a16:creationId xmlns:a16="http://schemas.microsoft.com/office/drawing/2014/main" id="{9637BFAE-F89B-43FA-B7E9-7EBD13318024}"/>
+              </a:ext>
+            </a:extLst>
+          </p:cNvPr>
+          <p:cNvPicPr>
+            <a:picLocks noChangeAspect="1"/>
+          </p:cNvPicPr>
+          <p:nvPr/>
+        </p:nvPicPr>
+        <p:blipFill>
+          <a:blip r:embed="rId4"/>
+          <a:stretch>
+            <a:fillRect/>
+          </a:stretch>
+        </p:blipFill>
         <p:spPr>
           <a:xfrm>
-            <a:off x="549067" y="1977938"/>
-            <a:ext cx="10394707" cy="3311189"/>
+            <a:off x="700191" y="1742872"/>
+            <a:ext cx="3274140" cy="3695845"/>
           </a:xfrm>
+          <a:prstGeom prst="rect">
+            <a:avLst/>
+          </a:prstGeom>
         </p:spPr>
-        <p:txBody>
-          <a:bodyPr>
-            <a:noAutofit/>
-          </a:bodyPr>
-          <a:lstStyle/>
-          <a:p>
-            <a:r>
-              <a:rPr lang="en-US" b="1" cap="none" dirty="0" smtClean="0">
-                <a:latin typeface="Times New Roman" panose="02020603050405020304" pitchFamily="18" charset="0"/>
-                <a:cs typeface="Times New Roman" panose="02020603050405020304" pitchFamily="18" charset="0"/>
-              </a:rPr>
-              <a:t>Books</a:t>
-            </a:r>
-          </a:p>
-          <a:p>
-            <a:pPr marL="0" indent="0">
-              <a:buNone/>
-            </a:pPr>
-            <a:endParaRPr lang="en-US" b="1" cap="none" dirty="0" smtClean="0">
-              <a:latin typeface="Times New Roman" panose="02020603050405020304" pitchFamily="18" charset="0"/>
-              <a:cs typeface="Times New Roman" panose="02020603050405020304" pitchFamily="18" charset="0"/>
-            </a:endParaRPr>
-          </a:p>
-          <a:p>
-            <a:endParaRPr lang="en-US" b="1" cap="none" dirty="0">
-              <a:latin typeface="Times New Roman" panose="02020603050405020304" pitchFamily="18" charset="0"/>
-              <a:cs typeface="Times New Roman" panose="02020603050405020304" pitchFamily="18" charset="0"/>
-            </a:endParaRPr>
-          </a:p>
-          <a:p>
-            <a:r>
-              <a:rPr lang="en-US" b="1" cap="none" dirty="0" smtClean="0">
-                <a:latin typeface="Times New Roman" panose="02020603050405020304" pitchFamily="18" charset="0"/>
-                <a:cs typeface="Times New Roman" panose="02020603050405020304" pitchFamily="18" charset="0"/>
-              </a:rPr>
-              <a:t>Electronics </a:t>
-            </a:r>
-          </a:p>
-          <a:p>
-            <a:endParaRPr lang="en-US" b="1" cap="none" dirty="0" smtClean="0">
-              <a:latin typeface="Times New Roman" panose="02020603050405020304" pitchFamily="18" charset="0"/>
-              <a:cs typeface="Times New Roman" panose="02020603050405020304" pitchFamily="18" charset="0"/>
-            </a:endParaRPr>
-          </a:p>
-          <a:p>
-            <a:endParaRPr lang="en-US" b="1" cap="none" dirty="0">
-              <a:latin typeface="Times New Roman" panose="02020603050405020304" pitchFamily="18" charset="0"/>
-              <a:cs typeface="Times New Roman" panose="02020603050405020304" pitchFamily="18" charset="0"/>
-            </a:endParaRPr>
-          </a:p>
-          <a:p>
-            <a:r>
-              <a:rPr lang="en-US" b="1" cap="none" dirty="0" smtClean="0">
-                <a:latin typeface="Times New Roman" panose="02020603050405020304" pitchFamily="18" charset="0"/>
-                <a:cs typeface="Times New Roman" panose="02020603050405020304" pitchFamily="18" charset="0"/>
-              </a:rPr>
-              <a:t>Kitchen</a:t>
-            </a:r>
-            <a:r>
-              <a:rPr lang="en-US" cap="none" dirty="0" smtClean="0">
-                <a:latin typeface="Times New Roman" panose="02020603050405020304" pitchFamily="18" charset="0"/>
-                <a:cs typeface="Times New Roman" panose="02020603050405020304" pitchFamily="18" charset="0"/>
-              </a:rPr>
-              <a:t> </a:t>
-            </a:r>
-          </a:p>
-        </p:txBody>
-      </p:sp>
+      </p:pic>
     </p:spTree>
     <p:extLst>
       <p:ext uri="{BB962C8B-B14F-4D97-AF65-F5344CB8AC3E}">
@@ -7570,7 +7572,7 @@
             <a:spLocks noGrp="1"/>
           </p:cNvSpPr>
           <p:nvPr>
-            <p:ph type="ctrTitle"/>
+            <p:ph type="title"/>
           </p:nvPr>
         </p:nvSpPr>
         <p:spPr/>
@@ -7579,25 +7581,76 @@
           <a:lstStyle/>
           <a:p>
             <a:r>
-              <a:rPr lang="en-US" dirty="0" smtClean="0">
-                <a:solidFill>
-                  <a:srgbClr val="002060"/>
-                </a:solidFill>
-              </a:rPr>
-              <a:t>Logistic Model</a:t>
-            </a:r>
-            <a:endParaRPr lang="en-US" dirty="0">
-              <a:solidFill>
-                <a:srgbClr val="002060"/>
-              </a:solidFill>
-            </a:endParaRPr>
-          </a:p>
-        </p:txBody>
-      </p:sp>
+              <a:rPr lang="en-US" dirty="0"/>
+              <a:t>Data Exploration – GRAPHS</a:t>
+            </a:r>
+          </a:p>
+        </p:txBody>
+      </p:sp>
+      <p:pic>
+        <p:nvPicPr>
+          <p:cNvPr id="3" name="Picture 2">
+            <a:extLst>
+              <a:ext uri="{FF2B5EF4-FFF2-40B4-BE49-F238E27FC236}">
+                <a16:creationId xmlns:a16="http://schemas.microsoft.com/office/drawing/2014/main" id="{80F2FE6A-CD0F-4A92-B1FE-A48131A96321}"/>
+              </a:ext>
+            </a:extLst>
+          </p:cNvPr>
+          <p:cNvPicPr>
+            <a:picLocks noChangeAspect="1"/>
+          </p:cNvPicPr>
+          <p:nvPr/>
+        </p:nvPicPr>
+        <p:blipFill>
+          <a:blip r:embed="rId2"/>
+          <a:stretch>
+            <a:fillRect/>
+          </a:stretch>
+        </p:blipFill>
+        <p:spPr>
+          <a:xfrm>
+            <a:off x="4312878" y="1813632"/>
+            <a:ext cx="1783122" cy="3638728"/>
+          </a:xfrm>
+          <a:prstGeom prst="rect">
+            <a:avLst/>
+          </a:prstGeom>
+        </p:spPr>
+      </p:pic>
+      <p:pic>
+        <p:nvPicPr>
+          <p:cNvPr id="4" name="Picture 3">
+            <a:extLst>
+              <a:ext uri="{FF2B5EF4-FFF2-40B4-BE49-F238E27FC236}">
+                <a16:creationId xmlns:a16="http://schemas.microsoft.com/office/drawing/2014/main" id="{A2FBDBAE-E302-48BF-BC14-033968065829}"/>
+              </a:ext>
+            </a:extLst>
+          </p:cNvPr>
+          <p:cNvPicPr>
+            <a:picLocks noChangeAspect="1"/>
+          </p:cNvPicPr>
+          <p:nvPr/>
+        </p:nvPicPr>
+        <p:blipFill>
+          <a:blip r:embed="rId3"/>
+          <a:stretch>
+            <a:fillRect/>
+          </a:stretch>
+        </p:blipFill>
+        <p:spPr>
+          <a:xfrm>
+            <a:off x="6096000" y="1813632"/>
+            <a:ext cx="1524000" cy="723900"/>
+          </a:xfrm>
+          <a:prstGeom prst="rect">
+            <a:avLst/>
+          </a:prstGeom>
+        </p:spPr>
+      </p:pic>
     </p:spTree>
     <p:extLst>
       <p:ext uri="{BB962C8B-B14F-4D97-AF65-F5344CB8AC3E}">
-        <p14:creationId xmlns:p14="http://schemas.microsoft.com/office/powerpoint/2010/main" val="4287023280"/>
+        <p14:creationId xmlns:p14="http://schemas.microsoft.com/office/powerpoint/2010/main" val="527883866"/>
       </p:ext>
     </p:extLst>
   </p:cSld>

</xml_diff>